<commit_message>
added MICE imputation and KNN imputation
</commit_message>
<xml_diff>
--- a/meetings/week 10 Meeting.pptx
+++ b/meetings/week 10 Meeting.pptx
@@ -548,6 +548,30 @@
       </pc:sldChg>
     </pc:docChg>
   </pc:docChgLst>
+  <pc:docChgLst>
+    <pc:chgData name="toby lee" userId="c2b0b406bfa6151f" providerId="LiveId" clId="{F5CDDF61-C7EB-4641-8847-58C108EA1870}"/>
+    <pc:docChg chg="modSld">
+      <pc:chgData name="toby lee" userId="c2b0b406bfa6151f" providerId="LiveId" clId="{F5CDDF61-C7EB-4641-8847-58C108EA1870}" dt="2022-01-12T19:30:02.190" v="1" actId="20577"/>
+      <pc:docMkLst>
+        <pc:docMk/>
+      </pc:docMkLst>
+      <pc:sldChg chg="modSp mod">
+        <pc:chgData name="toby lee" userId="c2b0b406bfa6151f" providerId="LiveId" clId="{F5CDDF61-C7EB-4641-8847-58C108EA1870}" dt="2022-01-12T19:30:02.190" v="1" actId="20577"/>
+        <pc:sldMkLst>
+          <pc:docMk/>
+          <pc:sldMk cId="3956411206" sldId="256"/>
+        </pc:sldMkLst>
+        <pc:spChg chg="mod">
+          <ac:chgData name="toby lee" userId="c2b0b406bfa6151f" providerId="LiveId" clId="{F5CDDF61-C7EB-4641-8847-58C108EA1870}" dt="2022-01-12T19:30:02.190" v="1" actId="20577"/>
+          <ac:spMkLst>
+            <pc:docMk/>
+            <pc:sldMk cId="3956411206" sldId="256"/>
+            <ac:spMk id="3" creationId="{29796D7D-3175-4BB8-9B63-55C81B20C750}"/>
+          </ac:spMkLst>
+        </pc:spChg>
+      </pc:sldChg>
+    </pc:docChg>
+  </pc:docChgLst>
 </pc:chgInfo>
 </file>
 
@@ -789,7 +813,7 @@
           <a:p>
             <a:fld id="{ED291B17-9318-49DB-B28B-6E5994AE9581}" type="datetime1">
               <a:rPr lang="en-US" smtClean="0"/>
-              <a:t>12/6/2021</a:t>
+              <a:t>1/12/2022</a:t>
             </a:fld>
             <a:endParaRPr lang="en-US" dirty="0"/>
           </a:p>
@@ -992,7 +1016,7 @@
           <a:p>
             <a:fld id="{2CED4963-E985-44C4-B8C4-FDD613B7C2F8}" type="datetime1">
               <a:rPr lang="en-US" smtClean="0"/>
-              <a:t>12/6/2021</a:t>
+              <a:t>1/12/2022</a:t>
             </a:fld>
             <a:endParaRPr lang="en-US" dirty="0"/>
           </a:p>
@@ -1354,7 +1378,7 @@
           <a:p>
             <a:fld id="{ED291B17-9318-49DB-B28B-6E5994AE9581}" type="datetime1">
               <a:rPr lang="en-US" smtClean="0"/>
-              <a:t>12/6/2021</a:t>
+              <a:t>1/12/2022</a:t>
             </a:fld>
             <a:endParaRPr lang="en-US" dirty="0"/>
           </a:p>
@@ -1552,7 +1576,7 @@
           <a:p>
             <a:fld id="{78DD82B9-B8EE-4375-B6FF-88FA6ABB15D9}" type="datetime1">
               <a:rPr lang="en-US" smtClean="0"/>
-              <a:t>12/6/2021</a:t>
+              <a:t>1/12/2022</a:t>
             </a:fld>
             <a:endParaRPr lang="en-US" dirty="0"/>
           </a:p>
@@ -1864,7 +1888,7 @@
           <a:p>
             <a:fld id="{B2497495-0637-405E-AE64-5CC7506D51F5}" type="datetime1">
               <a:rPr lang="en-US" smtClean="0"/>
-              <a:t>12/6/2021</a:t>
+              <a:t>1/12/2022</a:t>
             </a:fld>
             <a:endParaRPr lang="en-US" dirty="0"/>
           </a:p>
@@ -2117,7 +2141,7 @@
           <a:p>
             <a:fld id="{7BFFD690-9426-415D-8B65-26881E07B2D4}" type="datetime1">
               <a:rPr lang="en-US" smtClean="0"/>
-              <a:t>12/6/2021</a:t>
+              <a:t>1/12/2022</a:t>
             </a:fld>
             <a:endParaRPr lang="en-US" dirty="0"/>
           </a:p>
@@ -2539,7 +2563,7 @@
           <a:p>
             <a:fld id="{04C4989A-474C-40DE-95B9-011C28B71673}" type="datetime1">
               <a:rPr lang="en-US" smtClean="0"/>
-              <a:t>12/6/2021</a:t>
+              <a:t>1/12/2022</a:t>
             </a:fld>
             <a:endParaRPr lang="en-US" dirty="0"/>
           </a:p>
@@ -2662,7 +2686,7 @@
           <a:p>
             <a:fld id="{5DB4ED54-5B5E-4A04-93D3-5772E3CE3818}" type="datetime1">
               <a:rPr lang="en-US" smtClean="0"/>
-              <a:t>12/6/2021</a:t>
+              <a:t>1/12/2022</a:t>
             </a:fld>
             <a:endParaRPr lang="en-US" dirty="0"/>
           </a:p>
@@ -2757,7 +2781,7 @@
           <a:p>
             <a:fld id="{4EDE50D6-574B-40AF-946F-D52A04ADE379}" type="datetime1">
               <a:rPr lang="en-US" smtClean="0"/>
-              <a:t>12/6/2021</a:t>
+              <a:t>1/12/2022</a:t>
             </a:fld>
             <a:endParaRPr lang="en-US" dirty="0"/>
           </a:p>
@@ -3134,7 +3158,7 @@
           <a:p>
             <a:fld id="{D82884F1-FFEA-405F-9602-3DCA865EDA4E}" type="datetime1">
               <a:rPr lang="en-US" smtClean="0"/>
-              <a:t>12/6/2021</a:t>
+              <a:t>1/12/2022</a:t>
             </a:fld>
             <a:endParaRPr lang="en-US" dirty="0"/>
           </a:p>
@@ -3427,7 +3451,7 @@
           <a:p>
             <a:fld id="{7E18DB4A-8810-4A10-AD5C-D5E2C667F5B3}" type="datetime1">
               <a:rPr lang="en-US" smtClean="0"/>
-              <a:t>12/6/2021</a:t>
+              <a:t>1/12/2022</a:t>
             </a:fld>
             <a:endParaRPr lang="en-US" dirty="0"/>
           </a:p>
@@ -3642,7 +3666,7 @@
           <a:p>
             <a:fld id="{ED291B17-9318-49DB-B28B-6E5994AE9581}" type="datetime1">
               <a:rPr lang="en-US" smtClean="0"/>
-              <a:t>12/6/2021</a:t>
+              <a:t>1/12/2022</a:t>
             </a:fld>
             <a:endParaRPr lang="en-US" dirty="0"/>
           </a:p>
@@ -4562,8 +4586,12 @@
           <a:lstStyle/>
           <a:p>
             <a:r>
+              <a:rPr lang="en-GB"/>
+              <a:t>Week 12 </a:t>
+            </a:r>
+            <a:r>
               <a:rPr lang="en-GB" dirty="0"/>
-              <a:t>Week 10 Meeting, 6/12/2021</a:t>
+              <a:t>Meeting, 6/12/2021</a:t>
             </a:r>
             <a:endParaRPr lang="en-US" dirty="0"/>
           </a:p>

</xml_diff>